<commit_message>
Điều chỉnh nhỏ cho bài 14, thêm bài 15
</commit_message>
<xml_diff>
--- a/Bai 14 Phan lop va ung dung trong tim kiem.pptx
+++ b/Bai 14 Phan lop va ung dung trong tim kiem.pptx
@@ -167,7 +167,7 @@
   </p:defaultTextStyle>
   <p:extLst>
     <p:ext uri="{EFAFB233-063F-42B5-8137-9DF3F51BA10A}">
-      <p15:sldGuideLst xmlns:p15="http://schemas.microsoft.com/office/powerpoint/2012/main" xmlns="">
+      <p15:sldGuideLst xmlns="" xmlns:p15="http://schemas.microsoft.com/office/powerpoint/2012/main">
         <p15:guide id="1" orient="horz" pos="2160">
           <p15:clr>
             <a:srgbClr val="A4A3A4"/>
@@ -17626,7 +17626,7 @@
           <a:graphicData uri="http://schemas.openxmlformats.org/presentationml/2006/ole">
             <mc:AlternateContent xmlns:mc="http://schemas.openxmlformats.org/markup-compatibility/2006">
               <mc:Choice xmlns:v="urn:schemas-microsoft-com:vml" Requires="v">
-                <p:oleObj spid="_x0000_s1467" name="Формула" r:id="rId3" imgW="1473200" imgH="419100" progId="Equation.3">
+                <p:oleObj spid="_x0000_s1494" name="Формула" r:id="rId3" imgW="1473200" imgH="419100" progId="Equation.3">
                   <p:embed/>
                 </p:oleObj>
               </mc:Choice>
@@ -17715,7 +17715,7 @@
           <a:graphicData uri="http://schemas.openxmlformats.org/presentationml/2006/ole">
             <mc:AlternateContent xmlns:mc="http://schemas.openxmlformats.org/markup-compatibility/2006">
               <mc:Choice xmlns:v="urn:schemas-microsoft-com:vml" Requires="v">
-                <p:oleObj spid="_x0000_s1468" name="Формула" r:id="rId5" imgW="1511300" imgH="419100" progId="Equation.3">
+                <p:oleObj spid="_x0000_s1495" name="Формула" r:id="rId5" imgW="1511300" imgH="419100" progId="Equation.3">
                   <p:embed/>
                 </p:oleObj>
               </mc:Choice>
@@ -17804,7 +17804,7 @@
           <a:graphicData uri="http://schemas.openxmlformats.org/presentationml/2006/ole">
             <mc:AlternateContent xmlns:mc="http://schemas.openxmlformats.org/markup-compatibility/2006">
               <mc:Choice xmlns:v="urn:schemas-microsoft-com:vml" Requires="v">
-                <p:oleObj spid="_x0000_s1469" name="Equation" r:id="rId7" imgW="698400" imgH="393480" progId="Equation.3">
+                <p:oleObj spid="_x0000_s1496" name="Equation" r:id="rId7" imgW="698400" imgH="393480" progId="Equation.3">
                   <p:embed/>
                 </p:oleObj>
               </mc:Choice>
@@ -18878,8 +18878,8 @@
           </a:p>
         </p:txBody>
       </p:sp>
-      <mc:AlternateContent xmlns:mc="http://schemas.openxmlformats.org/markup-compatibility/2006" xmlns:a14="http://schemas.microsoft.com/office/drawing/2010/main">
-        <mc:Choice Requires="a14">
+      <mc:AlternateContent xmlns:mc="http://schemas.openxmlformats.org/markup-compatibility/2006">
+        <mc:Choice xmlns:a14="http://schemas.microsoft.com/office/drawing/2010/main" Requires="a14">
           <p:sp>
             <p:nvSpPr>
               <p:cNvPr id="6147" name="Rectangle 3"/>
@@ -18947,7 +18947,15 @@
                 <a:pPr lvl="1"/>
                 <a:r>
                   <a:rPr lang="vi-VN" sz="2400"/>
-                  <a:t>X là tập văn bản;</a:t>
+                  <a:t>D</a:t>
+                </a:r>
+                <a:r>
+                  <a:rPr lang="vi-VN" sz="2400" smtClean="0"/>
+                  <a:t> </a:t>
+                </a:r>
+                <a:r>
+                  <a:rPr lang="vi-VN" sz="2400"/>
+                  <a:t>là tập văn bản;</a:t>
                 </a:r>
               </a:p>
               <a:p>
@@ -19036,14 +19044,33 @@
                           <a:rPr lang="vi-VN" sz="2400">
                             <a:latin typeface="Cambria Math"/>
                           </a:rPr>
-                          <m:t> ∈ </m:t>
+                          <m:t> ∈</m:t>
                         </m:r>
-                        <m:r>
-                          <a:rPr lang="vi-VN" sz="2400">
-                            <a:latin typeface="Cambria Math"/>
-                          </a:rPr>
-                          <m:t>𝑋</m:t>
-                        </m:r>
+                        <m:sSub>
+                          <m:sSubPr>
+                            <m:ctrlPr>
+                              <a:rPr lang="vi-VN" sz="2400" b="0" i="1" smtClean="0">
+                                <a:latin typeface="Cambria Math"/>
+                              </a:rPr>
+                            </m:ctrlPr>
+                          </m:sSubPr>
+                          <m:e>
+                            <m:r>
+                              <a:rPr lang="vi-VN" sz="2400" b="0" i="1" smtClean="0">
+                                <a:latin typeface="Cambria Math"/>
+                              </a:rPr>
+                              <m:t>𝐷</m:t>
+                            </m:r>
+                          </m:e>
+                          <m:sub>
+                            <m:r>
+                              <a:rPr lang="vi-VN" sz="2400" b="0" i="1" smtClean="0">
+                                <a:latin typeface="Cambria Math"/>
+                              </a:rPr>
+                              <m:t>𝑡𝑟𝑎𝑖𝑛𝑖𝑛𝑔</m:t>
+                            </m:r>
+                          </m:sub>
+                        </m:sSub>
                         <m:r>
                           <a:rPr lang="vi-VN" sz="2400">
                             <a:latin typeface="Cambria Math"/>
@@ -19071,13 +19098,17 @@
                       </m:e>
                     </m:d>
                     <m:r>
-                      <a:rPr lang="vi-VN" sz="2400">
+                      <a:rPr lang="vi-VN" sz="2400" b="0" i="0" smtClean="0">
                         <a:latin typeface="Cambria Math"/>
                       </a:rPr>
-                      <m:t>,</m:t>
+                      <m:t> </m:t>
                     </m:r>
                   </m:oMath>
                 </a14:m>
+                <a:r>
+                  <a:rPr lang="vi-VN" sz="2400" smtClean="0"/>
+                  <a:t>, cho biết một số văn bản tiêu biểu thuộc các lớp đã cho.</a:t>
+                </a:r>
                 <a:endParaRPr lang="vi-VN" sz="2400"/>
               </a:p>
               <a:p>
@@ -19130,12 +19161,31 @@
                       </a:rPr>
                       <m:t>:</m:t>
                     </m:r>
-                    <m:r>
-                      <a:rPr lang="vi-VN" sz="2400">
-                        <a:latin typeface="Cambria Math"/>
-                      </a:rPr>
-                      <m:t>𝑋</m:t>
-                    </m:r>
+                    <m:sSub>
+                      <m:sSubPr>
+                        <m:ctrlPr>
+                          <a:rPr lang="vi-VN" sz="2400" b="0" i="1" smtClean="0">
+                            <a:latin typeface="Cambria Math"/>
+                          </a:rPr>
+                        </m:ctrlPr>
+                      </m:sSubPr>
+                      <m:e>
+                        <m:r>
+                          <a:rPr lang="vi-VN" sz="2400" b="0" i="1" smtClean="0">
+                            <a:latin typeface="Cambria Math"/>
+                          </a:rPr>
+                          <m:t>𝐷</m:t>
+                        </m:r>
+                      </m:e>
+                      <m:sub>
+                        <m:r>
+                          <a:rPr lang="vi-VN" sz="2400" b="0" i="1" smtClean="0">
+                            <a:latin typeface="Cambria Math"/>
+                          </a:rPr>
+                          <m:t>𝑡𝑟𝑎𝑖𝑛𝑖𝑛𝑔</m:t>
+                        </m:r>
+                      </m:sub>
+                    </m:sSub>
                     <m:r>
                       <a:rPr lang="vi-VN" sz="2400">
                         <a:latin typeface="Cambria Math"/>
@@ -19166,24 +19216,12 @@
                   <a:t> </a:t>
                 </a:r>
                 <a:r>
-                  <a:rPr lang="vi-VN" sz="2800"/>
-                  <a:t>là xác định định lớp phù hợp nhất với </a:t>
-                </a:r>
-                <a:r>
-                  <a:rPr lang="vi-VN" sz="2800" smtClean="0"/>
-                  <a:t>văn bản</a:t>
-                </a:r>
-                <a:r>
                   <a:rPr lang="en-US" sz="2800" smtClean="0"/>
-                  <a:t>, </a:t>
-                </a:r>
-                <a:r>
-                  <a:rPr lang="en-US" sz="2800" err="1"/>
-                  <a:t>cho</a:t>
+                  <a:t>cho </a:t>
                 </a:r>
                 <a:r>
                   <a:rPr lang="en-US" sz="2800"/>
-                  <a:t> d ∈ X </a:t>
+                  <a:t>d ∈ X </a:t>
                 </a:r>
                 <a:r>
                   <a:rPr lang="en-US" sz="2800" err="1"/>
@@ -19209,13 +19247,19 @@
                   <a:rPr lang="en-US" sz="2800"/>
                   <a:t> </a:t>
                 </a:r>
-                <a:r>
-                  <a:rPr lang="el-GR" sz="2800"/>
-                  <a:t>ϒ</a:t>
-                </a:r>
+                <a14:m>
+                  <m:oMath xmlns:m="http://schemas.openxmlformats.org/officeDocument/2006/math">
+                    <m:r>
+                      <a:rPr lang="vi-VN" sz="2800">
+                        <a:latin typeface="Cambria Math"/>
+                      </a:rPr>
+                      <m:t>𝛾</m:t>
+                    </m:r>
+                  </m:oMath>
+                </a14:m>
                 <a:r>
                   <a:rPr lang="en-US" sz="2800"/>
-                  <a:t> (d) ∈ C.</a:t>
+                  <a:t>(d) ∈ C.</a:t>
                 </a:r>
               </a:p>
               <a:p>
@@ -19225,7 +19269,7 @@
             </p:txBody>
           </p:sp>
         </mc:Choice>
-        <mc:Fallback xmlns="">
+        <mc:Fallback>
           <p:sp>
             <p:nvSpPr>
               <p:cNvPr id="6147" name="Rectangle 3"/>
@@ -19244,7 +19288,7 @@
               <a:blipFill rotWithShape="1">
                 <a:blip r:embed="rId3"/>
                 <a:stretch>
-                  <a:fillRect l="-292" t="-1259" r="-1534"/>
+                  <a:fillRect l="-292" t="-1259" r="-1534" b="-756"/>
                 </a:stretch>
               </a:blipFill>
               <a:ln>
@@ -21248,7 +21292,7 @@
   </a:extraClrSchemeLst>
   <a:extLst>
     <a:ext uri="{05A4C25C-085E-4340-85A3-A5531E510DB2}">
-      <thm15:themeFamily xmlns:thm15="http://schemas.microsoft.com/office/thememl/2012/main" xmlns="" name="Office Theme" id="{62F939B6-93AF-4DB8-9C6B-D6C7DFDC589F}" vid="{4A3C46E8-61CC-4603-A589-7422A47A8E4A}"/>
+      <thm15:themeFamily xmlns="" xmlns:thm15="http://schemas.microsoft.com/office/thememl/2012/main" name="Office Theme" id="{62F939B6-93AF-4DB8-9C6B-D6C7DFDC589F}" vid="{4A3C46E8-61CC-4603-A589-7422A47A8E4A}"/>
     </a:ext>
   </a:extLst>
 </a:theme>
@@ -21509,7 +21553,7 @@
   <a:extraClrSchemeLst/>
   <a:extLst>
     <a:ext uri="{05A4C25C-085E-4340-85A3-A5531E510DB2}">
-      <thm15:themeFamily xmlns:thm15="http://schemas.microsoft.com/office/thememl/2012/main" xmlns="" name="Office Theme" id="{62F939B6-93AF-4DB8-9C6B-D6C7DFDC589F}" vid="{4A3C46E8-61CC-4603-A589-7422A47A8E4A}"/>
+      <thm15:themeFamily xmlns="" xmlns:thm15="http://schemas.microsoft.com/office/thememl/2012/main" name="Office Theme" id="{62F939B6-93AF-4DB8-9C6B-D6C7DFDC589F}" vid="{4A3C46E8-61CC-4603-A589-7422A47A8E4A}"/>
     </a:ext>
   </a:extLst>
 </a:theme>

</xml_diff>